<commit_message>
fixed a bug with an image in section 6
</commit_message>
<xml_diff>
--- a/slides/figures/basis_breakdown.pptx
+++ b/slides/figures/basis_breakdown.pptx
@@ -156,7 +156,7 @@
           </a:lstStyle>
           <a:p>
             <a:r>
-              <a:rPr lang="en-US" smtClean="0"/>
+              <a:rPr lang="en-US"/>
               <a:t>Click to edit Master title style</a:t>
             </a:r>
             <a:endParaRPr lang="en-CA"/>
@@ -221,7 +221,7 @@
           </a:lstStyle>
           <a:p>
             <a:r>
-              <a:rPr lang="en-US" smtClean="0"/>
+              <a:rPr lang="en-US"/>
               <a:t>Click to edit Master subtitle style</a:t>
             </a:r>
             <a:endParaRPr lang="en-CA"/>
@@ -339,7 +339,7 @@
           <a:lstStyle/>
           <a:p>
             <a:r>
-              <a:rPr lang="en-US" smtClean="0"/>
+              <a:rPr lang="en-US"/>
               <a:t>Click to edit Master title style</a:t>
             </a:r>
             <a:endParaRPr lang="en-CA"/>
@@ -363,35 +363,35 @@
           <a:p>
             <a:pPr lvl="0"/>
             <a:r>
-              <a:rPr lang="en-US" smtClean="0"/>
+              <a:rPr lang="en-US"/>
               <a:t>Edit Master text styles</a:t>
             </a:r>
           </a:p>
           <a:p>
             <a:pPr lvl="1"/>
             <a:r>
-              <a:rPr lang="en-US" smtClean="0"/>
+              <a:rPr lang="en-US"/>
               <a:t>Second level</a:t>
             </a:r>
           </a:p>
           <a:p>
             <a:pPr lvl="2"/>
             <a:r>
-              <a:rPr lang="en-US" smtClean="0"/>
+              <a:rPr lang="en-US"/>
               <a:t>Third level</a:t>
             </a:r>
           </a:p>
           <a:p>
             <a:pPr lvl="3"/>
             <a:r>
-              <a:rPr lang="en-US" smtClean="0"/>
+              <a:rPr lang="en-US"/>
               <a:t>Fourth level</a:t>
             </a:r>
           </a:p>
           <a:p>
             <a:pPr lvl="4"/>
             <a:r>
-              <a:rPr lang="en-US" smtClean="0"/>
+              <a:rPr lang="en-US"/>
               <a:t>Fifth level</a:t>
             </a:r>
             <a:endParaRPr lang="en-CA"/>
@@ -514,7 +514,7 @@
           <a:lstStyle/>
           <a:p>
             <a:r>
-              <a:rPr lang="en-US" smtClean="0"/>
+              <a:rPr lang="en-US"/>
               <a:t>Click to edit Master title style</a:t>
             </a:r>
             <a:endParaRPr lang="en-CA"/>
@@ -543,35 +543,35 @@
           <a:p>
             <a:pPr lvl="0"/>
             <a:r>
-              <a:rPr lang="en-US" smtClean="0"/>
+              <a:rPr lang="en-US"/>
               <a:t>Edit Master text styles</a:t>
             </a:r>
           </a:p>
           <a:p>
             <a:pPr lvl="1"/>
             <a:r>
-              <a:rPr lang="en-US" smtClean="0"/>
+              <a:rPr lang="en-US"/>
               <a:t>Second level</a:t>
             </a:r>
           </a:p>
           <a:p>
             <a:pPr lvl="2"/>
             <a:r>
-              <a:rPr lang="en-US" smtClean="0"/>
+              <a:rPr lang="en-US"/>
               <a:t>Third level</a:t>
             </a:r>
           </a:p>
           <a:p>
             <a:pPr lvl="3"/>
             <a:r>
-              <a:rPr lang="en-US" smtClean="0"/>
+              <a:rPr lang="en-US"/>
               <a:t>Fourth level</a:t>
             </a:r>
           </a:p>
           <a:p>
             <a:pPr lvl="4"/>
             <a:r>
-              <a:rPr lang="en-US" smtClean="0"/>
+              <a:rPr lang="en-US"/>
               <a:t>Fifth level</a:t>
             </a:r>
             <a:endParaRPr lang="en-CA"/>
@@ -689,7 +689,7 @@
           <a:lstStyle/>
           <a:p>
             <a:r>
-              <a:rPr lang="en-US" smtClean="0"/>
+              <a:rPr lang="en-US"/>
               <a:t>Click to edit Master title style</a:t>
             </a:r>
             <a:endParaRPr lang="en-CA"/>
@@ -713,35 +713,35 @@
           <a:p>
             <a:pPr lvl="0"/>
             <a:r>
-              <a:rPr lang="en-US" smtClean="0"/>
+              <a:rPr lang="en-US"/>
               <a:t>Edit Master text styles</a:t>
             </a:r>
           </a:p>
           <a:p>
             <a:pPr lvl="1"/>
             <a:r>
-              <a:rPr lang="en-US" smtClean="0"/>
+              <a:rPr lang="en-US"/>
               <a:t>Second level</a:t>
             </a:r>
           </a:p>
           <a:p>
             <a:pPr lvl="2"/>
             <a:r>
-              <a:rPr lang="en-US" smtClean="0"/>
+              <a:rPr lang="en-US"/>
               <a:t>Third level</a:t>
             </a:r>
           </a:p>
           <a:p>
             <a:pPr lvl="3"/>
             <a:r>
-              <a:rPr lang="en-US" smtClean="0"/>
+              <a:rPr lang="en-US"/>
               <a:t>Fourth level</a:t>
             </a:r>
           </a:p>
           <a:p>
             <a:pPr lvl="4"/>
             <a:r>
-              <a:rPr lang="en-US" smtClean="0"/>
+              <a:rPr lang="en-US"/>
               <a:t>Fifth level</a:t>
             </a:r>
             <a:endParaRPr lang="en-CA"/>
@@ -868,7 +868,7 @@
           </a:lstStyle>
           <a:p>
             <a:r>
-              <a:rPr lang="en-US" smtClean="0"/>
+              <a:rPr lang="en-US"/>
               <a:t>Click to edit Master title style</a:t>
             </a:r>
             <a:endParaRPr lang="en-CA"/>
@@ -988,7 +988,7 @@
           <a:p>
             <a:pPr lvl="0"/>
             <a:r>
-              <a:rPr lang="en-US" smtClean="0"/>
+              <a:rPr lang="en-US"/>
               <a:t>Edit Master text styles</a:t>
             </a:r>
           </a:p>
@@ -1105,7 +1105,7 @@
           <a:lstStyle/>
           <a:p>
             <a:r>
-              <a:rPr lang="en-US" smtClean="0"/>
+              <a:rPr lang="en-US"/>
               <a:t>Click to edit Master title style</a:t>
             </a:r>
             <a:endParaRPr lang="en-CA"/>
@@ -1134,35 +1134,35 @@
           <a:p>
             <a:pPr lvl="0"/>
             <a:r>
-              <a:rPr lang="en-US" smtClean="0"/>
+              <a:rPr lang="en-US"/>
               <a:t>Edit Master text styles</a:t>
             </a:r>
           </a:p>
           <a:p>
             <a:pPr lvl="1"/>
             <a:r>
-              <a:rPr lang="en-US" smtClean="0"/>
+              <a:rPr lang="en-US"/>
               <a:t>Second level</a:t>
             </a:r>
           </a:p>
           <a:p>
             <a:pPr lvl="2"/>
             <a:r>
-              <a:rPr lang="en-US" smtClean="0"/>
+              <a:rPr lang="en-US"/>
               <a:t>Third level</a:t>
             </a:r>
           </a:p>
           <a:p>
             <a:pPr lvl="3"/>
             <a:r>
-              <a:rPr lang="en-US" smtClean="0"/>
+              <a:rPr lang="en-US"/>
               <a:t>Fourth level</a:t>
             </a:r>
           </a:p>
           <a:p>
             <a:pPr lvl="4"/>
             <a:r>
-              <a:rPr lang="en-US" smtClean="0"/>
+              <a:rPr lang="en-US"/>
               <a:t>Fifth level</a:t>
             </a:r>
             <a:endParaRPr lang="en-CA"/>
@@ -1191,35 +1191,35 @@
           <a:p>
             <a:pPr lvl="0"/>
             <a:r>
-              <a:rPr lang="en-US" smtClean="0"/>
+              <a:rPr lang="en-US"/>
               <a:t>Edit Master text styles</a:t>
             </a:r>
           </a:p>
           <a:p>
             <a:pPr lvl="1"/>
             <a:r>
-              <a:rPr lang="en-US" smtClean="0"/>
+              <a:rPr lang="en-US"/>
               <a:t>Second level</a:t>
             </a:r>
           </a:p>
           <a:p>
             <a:pPr lvl="2"/>
             <a:r>
-              <a:rPr lang="en-US" smtClean="0"/>
+              <a:rPr lang="en-US"/>
               <a:t>Third level</a:t>
             </a:r>
           </a:p>
           <a:p>
             <a:pPr lvl="3"/>
             <a:r>
-              <a:rPr lang="en-US" smtClean="0"/>
+              <a:rPr lang="en-US"/>
               <a:t>Fourth level</a:t>
             </a:r>
           </a:p>
           <a:p>
             <a:pPr lvl="4"/>
             <a:r>
-              <a:rPr lang="en-US" smtClean="0"/>
+              <a:rPr lang="en-US"/>
               <a:t>Fifth level</a:t>
             </a:r>
             <a:endParaRPr lang="en-CA"/>
@@ -1342,7 +1342,7 @@
           <a:lstStyle/>
           <a:p>
             <a:r>
-              <a:rPr lang="en-US" smtClean="0"/>
+              <a:rPr lang="en-US"/>
               <a:t>Click to edit Master title style</a:t>
             </a:r>
             <a:endParaRPr lang="en-CA"/>
@@ -1408,7 +1408,7 @@
           <a:p>
             <a:pPr lvl="0"/>
             <a:r>
-              <a:rPr lang="en-US" smtClean="0"/>
+              <a:rPr lang="en-US"/>
               <a:t>Edit Master text styles</a:t>
             </a:r>
           </a:p>
@@ -1436,35 +1436,35 @@
           <a:p>
             <a:pPr lvl="0"/>
             <a:r>
-              <a:rPr lang="en-US" smtClean="0"/>
+              <a:rPr lang="en-US"/>
               <a:t>Edit Master text styles</a:t>
             </a:r>
           </a:p>
           <a:p>
             <a:pPr lvl="1"/>
             <a:r>
-              <a:rPr lang="en-US" smtClean="0"/>
+              <a:rPr lang="en-US"/>
               <a:t>Second level</a:t>
             </a:r>
           </a:p>
           <a:p>
             <a:pPr lvl="2"/>
             <a:r>
-              <a:rPr lang="en-US" smtClean="0"/>
+              <a:rPr lang="en-US"/>
               <a:t>Third level</a:t>
             </a:r>
           </a:p>
           <a:p>
             <a:pPr lvl="3"/>
             <a:r>
-              <a:rPr lang="en-US" smtClean="0"/>
+              <a:rPr lang="en-US"/>
               <a:t>Fourth level</a:t>
             </a:r>
           </a:p>
           <a:p>
             <a:pPr lvl="4"/>
             <a:r>
-              <a:rPr lang="en-US" smtClean="0"/>
+              <a:rPr lang="en-US"/>
               <a:t>Fifth level</a:t>
             </a:r>
             <a:endParaRPr lang="en-CA"/>
@@ -1530,7 +1530,7 @@
           <a:p>
             <a:pPr lvl="0"/>
             <a:r>
-              <a:rPr lang="en-US" smtClean="0"/>
+              <a:rPr lang="en-US"/>
               <a:t>Edit Master text styles</a:t>
             </a:r>
           </a:p>
@@ -1558,35 +1558,35 @@
           <a:p>
             <a:pPr lvl="0"/>
             <a:r>
-              <a:rPr lang="en-US" smtClean="0"/>
+              <a:rPr lang="en-US"/>
               <a:t>Edit Master text styles</a:t>
             </a:r>
           </a:p>
           <a:p>
             <a:pPr lvl="1"/>
             <a:r>
-              <a:rPr lang="en-US" smtClean="0"/>
+              <a:rPr lang="en-US"/>
               <a:t>Second level</a:t>
             </a:r>
           </a:p>
           <a:p>
             <a:pPr lvl="2"/>
             <a:r>
-              <a:rPr lang="en-US" smtClean="0"/>
+              <a:rPr lang="en-US"/>
               <a:t>Third level</a:t>
             </a:r>
           </a:p>
           <a:p>
             <a:pPr lvl="3"/>
             <a:r>
-              <a:rPr lang="en-US" smtClean="0"/>
+              <a:rPr lang="en-US"/>
               <a:t>Fourth level</a:t>
             </a:r>
           </a:p>
           <a:p>
             <a:pPr lvl="4"/>
             <a:r>
-              <a:rPr lang="en-US" smtClean="0"/>
+              <a:rPr lang="en-US"/>
               <a:t>Fifth level</a:t>
             </a:r>
             <a:endParaRPr lang="en-CA"/>
@@ -1704,7 +1704,7 @@
           <a:lstStyle/>
           <a:p>
             <a:r>
-              <a:rPr lang="en-US" smtClean="0"/>
+              <a:rPr lang="en-US"/>
               <a:t>Click to edit Master title style</a:t>
             </a:r>
             <a:endParaRPr lang="en-CA"/>
@@ -1926,7 +1926,7 @@
           </a:lstStyle>
           <a:p>
             <a:r>
-              <a:rPr lang="en-US" smtClean="0"/>
+              <a:rPr lang="en-US"/>
               <a:t>Click to edit Master title style</a:t>
             </a:r>
             <a:endParaRPr lang="en-CA"/>
@@ -1983,35 +1983,35 @@
           <a:p>
             <a:pPr lvl="0"/>
             <a:r>
-              <a:rPr lang="en-US" smtClean="0"/>
+              <a:rPr lang="en-US"/>
               <a:t>Edit Master text styles</a:t>
             </a:r>
           </a:p>
           <a:p>
             <a:pPr lvl="1"/>
             <a:r>
-              <a:rPr lang="en-US" smtClean="0"/>
+              <a:rPr lang="en-US"/>
               <a:t>Second level</a:t>
             </a:r>
           </a:p>
           <a:p>
             <a:pPr lvl="2"/>
             <a:r>
-              <a:rPr lang="en-US" smtClean="0"/>
+              <a:rPr lang="en-US"/>
               <a:t>Third level</a:t>
             </a:r>
           </a:p>
           <a:p>
             <a:pPr lvl="3"/>
             <a:r>
-              <a:rPr lang="en-US" smtClean="0"/>
+              <a:rPr lang="en-US"/>
               <a:t>Fourth level</a:t>
             </a:r>
           </a:p>
           <a:p>
             <a:pPr lvl="4"/>
             <a:r>
-              <a:rPr lang="en-US" smtClean="0"/>
+              <a:rPr lang="en-US"/>
               <a:t>Fifth level</a:t>
             </a:r>
             <a:endParaRPr lang="en-CA"/>
@@ -2077,7 +2077,7 @@
           <a:p>
             <a:pPr lvl="0"/>
             <a:r>
-              <a:rPr lang="en-US" smtClean="0"/>
+              <a:rPr lang="en-US"/>
               <a:t>Edit Master text styles</a:t>
             </a:r>
           </a:p>
@@ -2203,7 +2203,7 @@
           </a:lstStyle>
           <a:p>
             <a:r>
-              <a:rPr lang="en-US" smtClean="0"/>
+              <a:rPr lang="en-US"/>
               <a:t>Click to edit Master title style</a:t>
             </a:r>
             <a:endParaRPr lang="en-CA"/>
@@ -2330,7 +2330,7 @@
           <a:p>
             <a:pPr lvl="0"/>
             <a:r>
-              <a:rPr lang="en-US" smtClean="0"/>
+              <a:rPr lang="en-US"/>
               <a:t>Edit Master text styles</a:t>
             </a:r>
           </a:p>
@@ -2462,7 +2462,7 @@
           <a:lstStyle/>
           <a:p>
             <a:r>
-              <a:rPr lang="en-US" smtClean="0"/>
+              <a:rPr lang="en-US"/>
               <a:t>Click to edit Master title style</a:t>
             </a:r>
             <a:endParaRPr lang="en-CA"/>
@@ -2496,35 +2496,35 @@
           <a:p>
             <a:pPr lvl="0"/>
             <a:r>
-              <a:rPr lang="en-US" smtClean="0"/>
+              <a:rPr lang="en-US"/>
               <a:t>Edit Master text styles</a:t>
             </a:r>
           </a:p>
           <a:p>
             <a:pPr lvl="1"/>
             <a:r>
-              <a:rPr lang="en-US" smtClean="0"/>
+              <a:rPr lang="en-US"/>
               <a:t>Second level</a:t>
             </a:r>
           </a:p>
           <a:p>
             <a:pPr lvl="2"/>
             <a:r>
-              <a:rPr lang="en-US" smtClean="0"/>
+              <a:rPr lang="en-US"/>
               <a:t>Third level</a:t>
             </a:r>
           </a:p>
           <a:p>
             <a:pPr lvl="3"/>
             <a:r>
-              <a:rPr lang="en-US" smtClean="0"/>
+              <a:rPr lang="en-US"/>
               <a:t>Fourth level</a:t>
             </a:r>
           </a:p>
           <a:p>
             <a:pPr lvl="4"/>
             <a:r>
-              <a:rPr lang="en-US" smtClean="0"/>
+              <a:rPr lang="en-US"/>
               <a:t>Fifth level</a:t>
             </a:r>
             <a:endParaRPr lang="en-CA"/>
@@ -5893,13 +5893,13 @@
           <a:lstStyle/>
           <a:p>
             <a:r>
-              <a:rPr lang="en-US" dirty="0" smtClean="0"/>
+              <a:rPr lang="en-US" dirty="0"/>
               <a:t>Random effects: </a:t>
             </a:r>
           </a:p>
           <a:p>
             <a:r>
-              <a:rPr lang="en-US" dirty="0" smtClean="0"/>
+              <a:rPr lang="en-US" dirty="0"/>
               <a:t>Only differences from the average penalized</a:t>
             </a:r>
             <a:endParaRPr lang="en-CA" dirty="0"/>
@@ -5929,13 +5929,13 @@
           <a:lstStyle/>
           <a:p>
             <a:r>
-              <a:rPr lang="en-US" dirty="0" smtClean="0"/>
+              <a:rPr lang="en-US" dirty="0"/>
               <a:t>Thin plate splines, cubic splines: </a:t>
             </a:r>
           </a:p>
           <a:p>
             <a:r>
-              <a:rPr lang="en-US" dirty="0" smtClean="0"/>
+              <a:rPr lang="en-US" dirty="0"/>
               <a:t>Penalty on the total average derivatives of the function</a:t>
             </a:r>
           </a:p>
@@ -5964,13 +5964,13 @@
           <a:lstStyle/>
           <a:p>
             <a:r>
-              <a:rPr lang="en-US" dirty="0" smtClean="0"/>
+              <a:rPr lang="en-US" dirty="0"/>
               <a:t>Markov Random fields:</a:t>
             </a:r>
           </a:p>
           <a:p>
             <a:r>
-              <a:rPr lang="en-US" dirty="0" smtClean="0"/>
+              <a:rPr lang="en-US" dirty="0"/>
               <a:t>Connected observations get pulled toward one another</a:t>
             </a:r>
             <a:endParaRPr lang="en-CA" dirty="0"/>
@@ -6545,14 +6545,13 @@
           <a:lstStyle/>
           <a:p>
             <a:r>
-              <a:rPr lang="en-US" dirty="0" smtClean="0"/>
+              <a:rPr lang="en-US" dirty="0"/>
               <a:t>Cyclic splines: </a:t>
             </a:r>
-            <a:endParaRPr lang="en-US" dirty="0"/>
           </a:p>
           <a:p>
             <a:r>
-              <a:rPr lang="en-US" dirty="0" smtClean="0"/>
+              <a:rPr lang="en-US" dirty="0"/>
               <a:t>End points of the curve are assumed to be equal to each other</a:t>
             </a:r>
           </a:p>
@@ -7914,13 +7913,6 @@
   <p:clrMapOvr>
     <a:masterClrMapping/>
   </p:clrMapOvr>
-  <p:timing>
-    <p:tnLst>
-      <p:par>
-        <p:cTn id="1" dur="indefinite" restart="never" nodeType="tmRoot"/>
-      </p:par>
-    </p:tnLst>
-  </p:timing>
 </p:sld>
 </file>
 
@@ -7992,7 +7984,7 @@
             <a:p>
               <a:pPr algn="ctr"/>
               <a:r>
-                <a:rPr lang="en-US" dirty="0" smtClean="0"/>
+                <a:rPr lang="en-US" dirty="0"/>
                 <a:t>1</a:t>
               </a:r>
               <a:endParaRPr lang="en-CA" dirty="0"/>
@@ -8036,7 +8028,7 @@
             <a:p>
               <a:pPr algn="ctr"/>
               <a:r>
-                <a:rPr lang="en-US" dirty="0" smtClean="0"/>
+                <a:rPr lang="en-US" dirty="0"/>
                 <a:t>4</a:t>
               </a:r>
               <a:endParaRPr lang="en-CA" dirty="0"/>
@@ -8080,7 +8072,7 @@
             <a:p>
               <a:pPr algn="ctr"/>
               <a:r>
-                <a:rPr lang="en-US" dirty="0" smtClean="0"/>
+                <a:rPr lang="en-US" dirty="0"/>
                 <a:t>2</a:t>
               </a:r>
               <a:endParaRPr lang="en-CA" dirty="0"/>
@@ -8124,7 +8116,7 @@
             <a:p>
               <a:pPr algn="ctr"/>
               <a:r>
-                <a:rPr lang="en-US" dirty="0" smtClean="0"/>
+                <a:rPr lang="en-US" dirty="0"/>
                 <a:t>3</a:t>
               </a:r>
               <a:endParaRPr lang="en-CA" dirty="0"/>
@@ -8252,7 +8244,7 @@
           <p:nvPr>
             <p:extLst>
               <p:ext uri="{D42A27DB-BD31-4B8C-83A1-F6EECF244321}">
-                <p14:modId xmlns:p14="http://schemas.microsoft.com/office/powerpoint/2010/main" val="2257471560"/>
+                <p14:modId xmlns:p14="http://schemas.microsoft.com/office/powerpoint/2010/main" val="2343358675"/>
               </p:ext>
             </p:extLst>
           </p:nvPr>
@@ -8305,7 +8297,7 @@
                     <a:p>
                       <a:pPr algn="ctr"/>
                       <a:r>
-                        <a:rPr lang="en-US" sz="3200" b="1" dirty="0" smtClean="0">
+                        <a:rPr lang="en-US" sz="3200" b="1" dirty="0">
                           <a:solidFill>
                             <a:schemeClr val="tx1"/>
                           </a:solidFill>
@@ -8366,7 +8358,7 @@
                     <a:p>
                       <a:pPr algn="ctr"/>
                       <a:r>
-                        <a:rPr lang="en-US" sz="3200" b="1" dirty="0" smtClean="0">
+                        <a:rPr lang="en-US" sz="3200" b="1" dirty="0">
                           <a:solidFill>
                             <a:schemeClr val="tx1"/>
                           </a:solidFill>
@@ -8427,7 +8419,7 @@
                     <a:p>
                       <a:pPr algn="ctr"/>
                       <a:r>
-                        <a:rPr lang="en-US" sz="3200" b="1" dirty="0" smtClean="0">
+                        <a:rPr lang="en-US" sz="3200" b="1" dirty="0">
                           <a:solidFill>
                             <a:schemeClr val="tx1"/>
                           </a:solidFill>
@@ -8488,7 +8480,7 @@
                     <a:p>
                       <a:pPr algn="ctr"/>
                       <a:r>
-                        <a:rPr lang="en-US" sz="3200" b="1" dirty="0" smtClean="0">
+                        <a:rPr lang="en-US" sz="3200" b="1" dirty="0">
                           <a:solidFill>
                             <a:schemeClr val="tx1"/>
                           </a:solidFill>
@@ -8556,7 +8548,7 @@
                     <a:p>
                       <a:pPr algn="ctr"/>
                       <a:r>
-                        <a:rPr lang="en-US" sz="3200" b="1" dirty="0" smtClean="0">
+                        <a:rPr lang="en-US" sz="3200" b="1" dirty="0">
                           <a:solidFill>
                             <a:schemeClr val="tx1"/>
                           </a:solidFill>
@@ -8617,7 +8609,7 @@
                     <a:p>
                       <a:pPr algn="ctr"/>
                       <a:r>
-                        <a:rPr lang="en-US" sz="3200" b="1" dirty="0" smtClean="0">
+                        <a:rPr lang="en-US" sz="3200" b="1" dirty="0">
                           <a:solidFill>
                             <a:schemeClr val="tx1"/>
                           </a:solidFill>
@@ -8678,7 +8670,7 @@
                     <a:p>
                       <a:pPr algn="ctr"/>
                       <a:r>
-                        <a:rPr lang="en-US" sz="3200" b="1" dirty="0" smtClean="0">
+                        <a:rPr lang="en-US" sz="3200" b="1" dirty="0">
                           <a:solidFill>
                             <a:schemeClr val="tx1"/>
                           </a:solidFill>
@@ -8739,7 +8731,7 @@
                     <a:p>
                       <a:pPr algn="ctr"/>
                       <a:r>
-                        <a:rPr lang="en-US" sz="3200" b="1" dirty="0" smtClean="0">
+                        <a:rPr lang="en-US" sz="3200" b="1" dirty="0">
                           <a:solidFill>
                             <a:schemeClr val="tx1"/>
                           </a:solidFill>
@@ -8807,7 +8799,7 @@
                     <a:p>
                       <a:pPr algn="ctr"/>
                       <a:r>
-                        <a:rPr lang="en-US" sz="3200" b="1" dirty="0" smtClean="0">
+                        <a:rPr lang="en-US" sz="3200" b="1" dirty="0">
                           <a:solidFill>
                             <a:schemeClr val="tx1"/>
                           </a:solidFill>
@@ -8868,7 +8860,7 @@
                     <a:p>
                       <a:pPr algn="ctr"/>
                       <a:r>
-                        <a:rPr lang="en-US" sz="3200" b="1" dirty="0" smtClean="0">
+                        <a:rPr lang="en-US" sz="3200" b="1" dirty="0">
                           <a:solidFill>
                             <a:schemeClr val="tx1"/>
                           </a:solidFill>
@@ -8929,12 +8921,12 @@
                     <a:p>
                       <a:pPr algn="ctr"/>
                       <a:r>
-                        <a:rPr lang="en-US" sz="3200" b="1" dirty="0" smtClean="0">
+                        <a:rPr lang="en-US" sz="3200" b="1">
                           <a:solidFill>
                             <a:schemeClr val="tx1"/>
                           </a:solidFill>
                         </a:rPr>
-                        <a:t>1</a:t>
+                        <a:t>2</a:t>
                       </a:r>
                       <a:endParaRPr lang="en-CA" sz="3200" b="1" dirty="0">
                         <a:solidFill>
@@ -8990,7 +8982,7 @@
                     <a:p>
                       <a:pPr algn="ctr"/>
                       <a:r>
-                        <a:rPr lang="en-US" sz="3200" b="1" dirty="0" smtClean="0">
+                        <a:rPr lang="en-US" sz="3200" b="1" dirty="0">
                           <a:solidFill>
                             <a:schemeClr val="tx1"/>
                           </a:solidFill>
@@ -9058,7 +9050,7 @@
                     <a:p>
                       <a:pPr algn="ctr"/>
                       <a:r>
-                        <a:rPr lang="en-US" sz="3200" b="1" dirty="0" smtClean="0">
+                        <a:rPr lang="en-US" sz="3200" b="1" dirty="0">
                           <a:solidFill>
                             <a:schemeClr val="tx1"/>
                           </a:solidFill>
@@ -9119,7 +9111,7 @@
                     <a:p>
                       <a:pPr algn="ctr"/>
                       <a:r>
-                        <a:rPr lang="en-US" sz="3200" b="1" dirty="0" smtClean="0">
+                        <a:rPr lang="en-US" sz="3200" b="1" dirty="0">
                           <a:solidFill>
                             <a:schemeClr val="tx1"/>
                           </a:solidFill>
@@ -9180,7 +9172,7 @@
                     <a:p>
                       <a:pPr algn="ctr"/>
                       <a:r>
-                        <a:rPr lang="en-US" sz="3200" b="1" dirty="0" smtClean="0">
+                        <a:rPr lang="en-US" sz="3200" b="1" dirty="0">
                           <a:solidFill>
                             <a:schemeClr val="tx1"/>
                           </a:solidFill>
@@ -9241,7 +9233,7 @@
                     <a:p>
                       <a:pPr algn="ctr"/>
                       <a:r>
-                        <a:rPr lang="en-US" sz="3200" b="1" dirty="0" smtClean="0">
+                        <a:rPr lang="en-US" sz="3200" b="1" dirty="0">
                           <a:solidFill>
                             <a:schemeClr val="tx1"/>
                           </a:solidFill>
@@ -9374,7 +9366,7 @@
                     <a:p>
                       <a:pPr algn="ctr"/>
                       <a:r>
-                        <a:rPr lang="en-US" sz="2400" b="1" dirty="0" smtClean="0">
+                        <a:rPr lang="en-US" sz="2400" b="1" dirty="0">
                           <a:solidFill>
                             <a:schemeClr val="tx1"/>
                           </a:solidFill>
@@ -9435,7 +9427,7 @@
                     <a:p>
                       <a:pPr algn="ctr"/>
                       <a:r>
-                        <a:rPr lang="en-US" sz="2400" b="1" dirty="0" smtClean="0">
+                        <a:rPr lang="en-US" sz="2400" b="1" dirty="0">
                           <a:solidFill>
                             <a:schemeClr val="tx1"/>
                           </a:solidFill>
@@ -9496,7 +9488,7 @@
                     <a:p>
                       <a:pPr algn="ctr"/>
                       <a:r>
-                        <a:rPr lang="en-US" sz="2400" b="1" dirty="0" smtClean="0">
+                        <a:rPr lang="en-US" sz="2400" b="1" dirty="0">
                           <a:solidFill>
                             <a:schemeClr val="tx1"/>
                           </a:solidFill>
@@ -9557,7 +9549,7 @@
                     <a:p>
                       <a:pPr algn="ctr"/>
                       <a:r>
-                        <a:rPr lang="en-US" sz="2400" b="1" dirty="0" smtClean="0">
+                        <a:rPr lang="en-US" sz="2400" b="1" dirty="0">
                           <a:solidFill>
                             <a:schemeClr val="tx1"/>
                           </a:solidFill>
@@ -9618,7 +9610,7 @@
                     <a:p>
                       <a:pPr algn="ctr"/>
                       <a:r>
-                        <a:rPr lang="en-US" sz="2400" b="1" dirty="0" smtClean="0">
+                        <a:rPr lang="en-US" sz="2400" b="1" dirty="0">
                           <a:solidFill>
                             <a:schemeClr val="tx1"/>
                           </a:solidFill>
@@ -9686,7 +9678,7 @@
                     <a:p>
                       <a:pPr algn="ctr"/>
                       <a:r>
-                        <a:rPr lang="en-US" sz="2400" b="1" dirty="0" smtClean="0">
+                        <a:rPr lang="en-US" sz="2400" b="1" dirty="0">
                           <a:solidFill>
                             <a:schemeClr val="tx1"/>
                           </a:solidFill>
@@ -9747,7 +9739,7 @@
                     <a:p>
                       <a:pPr algn="ctr"/>
                       <a:r>
-                        <a:rPr lang="en-US" sz="2400" b="1" dirty="0" smtClean="0">
+                        <a:rPr lang="en-US" sz="2400" b="1" dirty="0">
                           <a:solidFill>
                             <a:schemeClr val="tx1"/>
                           </a:solidFill>
@@ -9808,7 +9800,7 @@
                     <a:p>
                       <a:pPr algn="ctr"/>
                       <a:r>
-                        <a:rPr lang="en-US" sz="2400" b="1" dirty="0" smtClean="0">
+                        <a:rPr lang="en-US" sz="2400" b="1" dirty="0">
                           <a:solidFill>
                             <a:schemeClr val="tx1"/>
                           </a:solidFill>
@@ -9869,7 +9861,7 @@
                     <a:p>
                       <a:pPr algn="ctr"/>
                       <a:r>
-                        <a:rPr lang="en-US" sz="2400" b="1" dirty="0" smtClean="0">
+                        <a:rPr lang="en-US" sz="2400" b="1" dirty="0">
                           <a:solidFill>
                             <a:schemeClr val="tx1"/>
                           </a:solidFill>
@@ -9930,7 +9922,7 @@
                     <a:p>
                       <a:pPr algn="ctr"/>
                       <a:r>
-                        <a:rPr lang="en-US" sz="2400" b="1" dirty="0" smtClean="0">
+                        <a:rPr lang="en-US" sz="2400" b="1" dirty="0">
                           <a:solidFill>
                             <a:schemeClr val="tx1"/>
                           </a:solidFill>
@@ -9998,7 +9990,7 @@
                     <a:p>
                       <a:pPr algn="ctr"/>
                       <a:r>
-                        <a:rPr lang="en-US" sz="2400" b="1" dirty="0" smtClean="0">
+                        <a:rPr lang="en-US" sz="2400" b="1" dirty="0">
                           <a:solidFill>
                             <a:schemeClr val="tx1"/>
                           </a:solidFill>
@@ -10059,7 +10051,7 @@
                     <a:p>
                       <a:pPr algn="ctr"/>
                       <a:r>
-                        <a:rPr lang="en-US" sz="2400" b="1" dirty="0" smtClean="0">
+                        <a:rPr lang="en-US" sz="2400" b="1" dirty="0">
                           <a:solidFill>
                             <a:schemeClr val="tx1"/>
                           </a:solidFill>
@@ -10120,7 +10112,7 @@
                     <a:p>
                       <a:pPr algn="ctr"/>
                       <a:r>
-                        <a:rPr lang="en-US" sz="2400" b="1" dirty="0" smtClean="0">
+                        <a:rPr lang="en-US" sz="2400" b="1" dirty="0">
                           <a:solidFill>
                             <a:schemeClr val="tx1"/>
                           </a:solidFill>
@@ -10181,7 +10173,7 @@
                     <a:p>
                       <a:pPr algn="ctr"/>
                       <a:r>
-                        <a:rPr lang="en-US" sz="2400" b="1" dirty="0" smtClean="0">
+                        <a:rPr lang="en-US" sz="2400" b="1" dirty="0">
                           <a:solidFill>
                             <a:schemeClr val="tx1"/>
                           </a:solidFill>
@@ -10242,7 +10234,7 @@
                     <a:p>
                       <a:pPr algn="ctr"/>
                       <a:r>
-                        <a:rPr lang="en-US" sz="2400" b="1" dirty="0" smtClean="0">
+                        <a:rPr lang="en-US" sz="2400" b="1" dirty="0">
                           <a:solidFill>
                             <a:schemeClr val="tx1"/>
                           </a:solidFill>
@@ -10310,7 +10302,7 @@
                     <a:p>
                       <a:pPr algn="ctr"/>
                       <a:r>
-                        <a:rPr lang="en-US" sz="2400" b="1" dirty="0" smtClean="0">
+                        <a:rPr lang="en-US" sz="2400" b="1" dirty="0">
                           <a:solidFill>
                             <a:schemeClr val="tx1"/>
                           </a:solidFill>
@@ -10371,7 +10363,7 @@
                     <a:p>
                       <a:pPr algn="ctr"/>
                       <a:r>
-                        <a:rPr lang="en-US" sz="2400" b="1" dirty="0" smtClean="0">
+                        <a:rPr lang="en-US" sz="2400" b="1" dirty="0">
                           <a:solidFill>
                             <a:schemeClr val="tx1"/>
                           </a:solidFill>
@@ -10432,7 +10424,7 @@
                     <a:p>
                       <a:pPr algn="ctr"/>
                       <a:r>
-                        <a:rPr lang="en-US" sz="2400" b="1" dirty="0" smtClean="0">
+                        <a:rPr lang="en-US" sz="2400" b="1" dirty="0">
                           <a:solidFill>
                             <a:schemeClr val="tx1"/>
                           </a:solidFill>
@@ -10493,7 +10485,7 @@
                     <a:p>
                       <a:pPr algn="ctr"/>
                       <a:r>
-                        <a:rPr lang="en-US" sz="2400" b="1" dirty="0" smtClean="0">
+                        <a:rPr lang="en-US" sz="2400" b="1" dirty="0">
                           <a:solidFill>
                             <a:schemeClr val="tx1"/>
                           </a:solidFill>
@@ -10554,7 +10546,7 @@
                     <a:p>
                       <a:pPr algn="ctr"/>
                       <a:r>
-                        <a:rPr lang="en-US" sz="2400" b="1" dirty="0" smtClean="0">
+                        <a:rPr lang="en-US" sz="2400" b="1" dirty="0">
                           <a:solidFill>
                             <a:schemeClr val="tx1"/>
                           </a:solidFill>
@@ -10622,7 +10614,7 @@
                     <a:p>
                       <a:pPr algn="ctr"/>
                       <a:r>
-                        <a:rPr lang="en-US" sz="2400" b="1" dirty="0" smtClean="0">
+                        <a:rPr lang="en-US" sz="2400" b="1" dirty="0">
                           <a:solidFill>
                             <a:schemeClr val="tx1"/>
                           </a:solidFill>
@@ -10683,7 +10675,7 @@
                     <a:p>
                       <a:pPr algn="ctr"/>
                       <a:r>
-                        <a:rPr lang="en-US" sz="2400" b="1" dirty="0" smtClean="0">
+                        <a:rPr lang="en-US" sz="2400" b="1" dirty="0">
                           <a:solidFill>
                             <a:schemeClr val="tx1"/>
                           </a:solidFill>
@@ -10744,7 +10736,7 @@
                     <a:p>
                       <a:pPr algn="ctr"/>
                       <a:r>
-                        <a:rPr lang="en-US" sz="2400" b="1" dirty="0" smtClean="0">
+                        <a:rPr lang="en-US" sz="2400" b="1" dirty="0">
                           <a:solidFill>
                             <a:schemeClr val="tx1"/>
                           </a:solidFill>
@@ -10805,7 +10797,7 @@
                     <a:p>
                       <a:pPr algn="ctr"/>
                       <a:r>
-                        <a:rPr lang="en-US" sz="2400" b="1" dirty="0" smtClean="0">
+                        <a:rPr lang="en-US" sz="2400" b="1" dirty="0">
                           <a:solidFill>
                             <a:schemeClr val="tx1"/>
                           </a:solidFill>
@@ -10866,7 +10858,7 @@
                     <a:p>
                       <a:pPr algn="ctr"/>
                       <a:r>
-                        <a:rPr lang="en-US" sz="2400" b="1" dirty="0" smtClean="0">
+                        <a:rPr lang="en-US" sz="2400" b="1" dirty="0">
                           <a:solidFill>
                             <a:schemeClr val="tx1"/>
                           </a:solidFill>
@@ -11539,7 +11531,7 @@
             <a:lstStyle/>
             <a:p>
               <a:r>
-                <a:rPr lang="en-US" dirty="0" smtClean="0"/>
+                <a:rPr lang="en-US" dirty="0"/>
                 <a:t>1</a:t>
               </a:r>
               <a:endParaRPr lang="en-CA" dirty="0"/>
@@ -11569,7 +11561,7 @@
             <a:lstStyle/>
             <a:p>
               <a:r>
-                <a:rPr lang="en-US" dirty="0" smtClean="0"/>
+                <a:rPr lang="en-US" dirty="0"/>
                 <a:t>2</a:t>
               </a:r>
               <a:endParaRPr lang="en-CA" dirty="0"/>
@@ -11599,7 +11591,7 @@
             <a:lstStyle/>
             <a:p>
               <a:r>
-                <a:rPr lang="en-US" dirty="0" smtClean="0"/>
+                <a:rPr lang="en-US" dirty="0"/>
                 <a:t>3</a:t>
               </a:r>
               <a:endParaRPr lang="en-CA" dirty="0"/>
@@ -11629,7 +11621,7 @@
             <a:lstStyle/>
             <a:p>
               <a:r>
-                <a:rPr lang="en-US" dirty="0" smtClean="0"/>
+                <a:rPr lang="en-US" dirty="0"/>
                 <a:t>4</a:t>
               </a:r>
               <a:endParaRPr lang="en-CA" dirty="0"/>
@@ -11659,7 +11651,7 @@
             <a:lstStyle/>
             <a:p>
               <a:r>
-                <a:rPr lang="en-US" dirty="0" smtClean="0"/>
+                <a:rPr lang="en-US" dirty="0"/>
                 <a:t>5</a:t>
               </a:r>
               <a:endParaRPr lang="en-CA" dirty="0"/>

</xml_diff>